<commit_message>
Update class 5 slides
</commit_message>
<xml_diff>
--- a/Collaterals/IntelMakersUniversity - class 5.pptx
+++ b/Collaterals/IntelMakersUniversity - class 5.pptx
@@ -6,10 +6,10 @@
     <p:sldMasterId id="2147483691" r:id="rId2"/>
   </p:sldMasterIdLst>
   <p:notesMasterIdLst>
-    <p:notesMasterId r:id="rId16"/>
+    <p:notesMasterId r:id="rId17"/>
   </p:notesMasterIdLst>
   <p:handoutMasterIdLst>
-    <p:handoutMasterId r:id="rId17"/>
+    <p:handoutMasterId r:id="rId18"/>
   </p:handoutMasterIdLst>
   <p:sldIdLst>
     <p:sldId id="318" r:id="rId3"/>
@@ -20,11 +20,12 @@
     <p:sldId id="352" r:id="rId8"/>
     <p:sldId id="356" r:id="rId9"/>
     <p:sldId id="357" r:id="rId10"/>
-    <p:sldId id="358" r:id="rId11"/>
-    <p:sldId id="355" r:id="rId12"/>
-    <p:sldId id="359" r:id="rId13"/>
-    <p:sldId id="361" r:id="rId14"/>
-    <p:sldId id="294" r:id="rId15"/>
+    <p:sldId id="362" r:id="rId11"/>
+    <p:sldId id="358" r:id="rId12"/>
+    <p:sldId id="355" r:id="rId13"/>
+    <p:sldId id="359" r:id="rId14"/>
+    <p:sldId id="361" r:id="rId15"/>
+    <p:sldId id="294" r:id="rId16"/>
   </p:sldIdLst>
   <p:sldSz cx="9144000" cy="5143500" type="screen16x9"/>
   <p:notesSz cx="6858000" cy="9144000"/>
@@ -254,7 +255,7 @@
                 <a:latin typeface="Intel Clear"/>
               </a:rPr>
               <a:pPr/>
-              <a:t>2/17/2020</a:t>
+              <a:t>2/18/2020</a:t>
             </a:fld>
             <a:endParaRPr lang="en-US" dirty="0">
               <a:latin typeface="Intel Clear"/>
@@ -434,7 +435,7 @@
             <a:fld id="{ED7FC5FE-6F0D-D34A-8EE6-C95B4F5F4DC8}" type="datetimeFigureOut">
               <a:rPr lang="en-US" smtClean="0"/>
               <a:pPr/>
-              <a:t>2/17/2020</a:t>
+              <a:t>2/18/2020</a:t>
             </a:fld>
             <a:endParaRPr lang="en-US" dirty="0"/>
           </a:p>
@@ -773,7 +774,7 @@
             <a:fld id="{D61C8689-8455-3546-ADF9-3B7273760F66}" type="slidenum">
               <a:rPr lang="en-US" smtClean="0"/>
               <a:pPr/>
-              <a:t>11</a:t>
+              <a:t>12</a:t>
             </a:fld>
             <a:endParaRPr lang="en-US" dirty="0"/>
           </a:p>
@@ -1061,7 +1062,7 @@
           <a:noFill/>
           <a:extLst>
             <a:ext uri="{909E8E84-426E-40dd-AFC4-6F175D3DCCD1}">
-              <a14:hiddenFill xmlns="" xmlns:a14="http://schemas.microsoft.com/office/drawing/2010/main">
+              <a14:hiddenFill xmlns:a14="http://schemas.microsoft.com/office/drawing/2010/main" xmlns="">
                 <a:solidFill>
                   <a:srgbClr val="FFFFFF"/>
                 </a:solidFill>
@@ -3935,7 +3936,7 @@
           <a:noFill/>
           <a:extLst>
             <a:ext uri="{909E8E84-426E-40dd-AFC4-6F175D3DCCD1}">
-              <a14:hiddenFill xmlns="" xmlns:a14="http://schemas.microsoft.com/office/drawing/2010/main">
+              <a14:hiddenFill xmlns:a14="http://schemas.microsoft.com/office/drawing/2010/main" xmlns="">
                 <a:solidFill>
                   <a:srgbClr val="FFFFFF"/>
                 </a:solidFill>
@@ -4104,7 +4105,7 @@
           <a:noFill/>
           <a:extLst>
             <a:ext uri="{909E8E84-426E-40dd-AFC4-6F175D3DCCD1}">
-              <a14:hiddenFill xmlns="" xmlns:a14="http://schemas.microsoft.com/office/drawing/2010/main">
+              <a14:hiddenFill xmlns:a14="http://schemas.microsoft.com/office/drawing/2010/main" xmlns="">
                 <a:solidFill>
                   <a:srgbClr val="FFFFFF"/>
                 </a:solidFill>
@@ -4499,7 +4500,7 @@
           <a:noFill/>
           <a:extLst>
             <a:ext uri="{909E8E84-426E-40dd-AFC4-6F175D3DCCD1}">
-              <a14:hiddenFill xmlns="" xmlns:a14="http://schemas.microsoft.com/office/drawing/2010/main">
+              <a14:hiddenFill xmlns:a14="http://schemas.microsoft.com/office/drawing/2010/main" xmlns="">
                 <a:solidFill>
                   <a:srgbClr val="FFFFFF"/>
                 </a:solidFill>
@@ -4802,7 +4803,7 @@
           <a:noFill/>
           <a:extLst>
             <a:ext uri="{909E8E84-426E-40dd-AFC4-6F175D3DCCD1}">
-              <a14:hiddenFill xmlns="" xmlns:a14="http://schemas.microsoft.com/office/drawing/2010/main">
+              <a14:hiddenFill xmlns:a14="http://schemas.microsoft.com/office/drawing/2010/main" xmlns="">
                 <a:solidFill>
                   <a:srgbClr val="FFFFFF"/>
                 </a:solidFill>
@@ -5138,7 +5139,7 @@
           <a:noFill/>
           <a:extLst>
             <a:ext uri="{909E8E84-426E-40dd-AFC4-6F175D3DCCD1}">
-              <a14:hiddenFill xmlns="" xmlns:a14="http://schemas.microsoft.com/office/drawing/2010/main">
+              <a14:hiddenFill xmlns:a14="http://schemas.microsoft.com/office/drawing/2010/main" xmlns="">
                 <a:solidFill>
                   <a:srgbClr val="FFFFFF"/>
                 </a:solidFill>
@@ -9354,7 +9355,7 @@
           <a:noFill/>
           <a:extLst>
             <a:ext uri="{909E8E84-426E-40dd-AFC4-6F175D3DCCD1}">
-              <a14:hiddenFill xmlns="" xmlns:a14="http://schemas.microsoft.com/office/drawing/2010/main">
+              <a14:hiddenFill xmlns:a14="http://schemas.microsoft.com/office/drawing/2010/main" xmlns="">
                 <a:solidFill>
                   <a:srgbClr val="FFFFFF"/>
                 </a:solidFill>
@@ -9598,7 +9599,7 @@
           <a:noFill/>
           <a:extLst>
             <a:ext uri="{909E8E84-426E-40dd-AFC4-6F175D3DCCD1}">
-              <a14:hiddenFill xmlns="" xmlns:a14="http://schemas.microsoft.com/office/drawing/2010/main">
+              <a14:hiddenFill xmlns:a14="http://schemas.microsoft.com/office/drawing/2010/main" xmlns="">
                 <a:solidFill>
                   <a:srgbClr val="FFFFFF"/>
                 </a:solidFill>
@@ -11023,7 +11024,7 @@
           <a:noFill/>
           <a:extLst>
             <a:ext uri="{909E8E84-426E-40dd-AFC4-6F175D3DCCD1}">
-              <a14:hiddenFill xmlns="" xmlns:a14="http://schemas.microsoft.com/office/drawing/2010/main">
+              <a14:hiddenFill xmlns:a14="http://schemas.microsoft.com/office/drawing/2010/main" xmlns="">
                 <a:solidFill>
                   <a:srgbClr val="FFFFFF"/>
                 </a:solidFill>
@@ -11640,7 +11641,7 @@
           <a:noFill/>
           <a:extLst>
             <a:ext uri="{909E8E84-426E-40dd-AFC4-6F175D3DCCD1}">
-              <a14:hiddenFill xmlns="" xmlns:a14="http://schemas.microsoft.com/office/drawing/2010/main">
+              <a14:hiddenFill xmlns:a14="http://schemas.microsoft.com/office/drawing/2010/main" xmlns="">
                 <a:solidFill>
                   <a:srgbClr val="FFFFFF"/>
                 </a:solidFill>
@@ -12383,6 +12384,236 @@
             </a:pPr>
             <a:r>
               <a:rPr lang="en-US" sz="3600" dirty="0"/>
+              <a:t>Interrupts – from an I/O pin</a:t>
+            </a:r>
+          </a:p>
+        </p:txBody>
+      </p:sp>
+      <p:pic>
+        <p:nvPicPr>
+          <p:cNvPr id="10" name="Picture 9">
+            <a:extLst>
+              <a:ext uri="{FF2B5EF4-FFF2-40B4-BE49-F238E27FC236}">
+                <a16:creationId xmlns:a16="http://schemas.microsoft.com/office/drawing/2014/main" id="{0E131498-53B6-4AC0-B776-EE34A971A3EE}"/>
+              </a:ext>
+            </a:extLst>
+          </p:cNvPr>
+          <p:cNvPicPr>
+            <a:picLocks noChangeAspect="1"/>
+          </p:cNvPicPr>
+          <p:nvPr/>
+        </p:nvPicPr>
+        <p:blipFill>
+          <a:blip r:embed="rId2"/>
+          <a:stretch>
+            <a:fillRect/>
+          </a:stretch>
+        </p:blipFill>
+        <p:spPr>
+          <a:xfrm>
+            <a:off x="455613" y="851601"/>
+            <a:ext cx="3048157" cy="285765"/>
+          </a:xfrm>
+          <a:prstGeom prst="rect">
+            <a:avLst/>
+          </a:prstGeom>
+        </p:spPr>
+      </p:pic>
+      <p:pic>
+        <p:nvPicPr>
+          <p:cNvPr id="11" name="Picture 10">
+            <a:extLst>
+              <a:ext uri="{FF2B5EF4-FFF2-40B4-BE49-F238E27FC236}">
+                <a16:creationId xmlns:a16="http://schemas.microsoft.com/office/drawing/2014/main" id="{2A77DAE2-ABA6-4270-AA7A-79AC4F9C03D9}"/>
+              </a:ext>
+            </a:extLst>
+          </p:cNvPr>
+          <p:cNvPicPr>
+            <a:picLocks noChangeAspect="1"/>
+          </p:cNvPicPr>
+          <p:nvPr/>
+        </p:nvPicPr>
+        <p:blipFill>
+          <a:blip r:embed="rId3"/>
+          <a:stretch>
+            <a:fillRect/>
+          </a:stretch>
+        </p:blipFill>
+        <p:spPr>
+          <a:xfrm>
+            <a:off x="3729746" y="1224463"/>
+            <a:ext cx="4030464" cy="1216816"/>
+          </a:xfrm>
+          <a:prstGeom prst="rect">
+            <a:avLst/>
+          </a:prstGeom>
+        </p:spPr>
+      </p:pic>
+      <p:pic>
+        <p:nvPicPr>
+          <p:cNvPr id="13" name="Picture 12">
+            <a:extLst>
+              <a:ext uri="{FF2B5EF4-FFF2-40B4-BE49-F238E27FC236}">
+                <a16:creationId xmlns:a16="http://schemas.microsoft.com/office/drawing/2014/main" id="{E5752BCD-FE8E-4D62-BC1F-9F016039C638}"/>
+              </a:ext>
+            </a:extLst>
+          </p:cNvPr>
+          <p:cNvPicPr>
+            <a:picLocks noChangeAspect="1"/>
+          </p:cNvPicPr>
+          <p:nvPr/>
+        </p:nvPicPr>
+        <p:blipFill>
+          <a:blip r:embed="rId4"/>
+          <a:stretch>
+            <a:fillRect/>
+          </a:stretch>
+        </p:blipFill>
+        <p:spPr>
+          <a:xfrm>
+            <a:off x="455613" y="1300236"/>
+            <a:ext cx="3006289" cy="3129297"/>
+          </a:xfrm>
+          <a:prstGeom prst="rect">
+            <a:avLst/>
+          </a:prstGeom>
+        </p:spPr>
+      </p:pic>
+      <p:pic>
+        <p:nvPicPr>
+          <p:cNvPr id="14" name="Picture 13">
+            <a:extLst>
+              <a:ext uri="{FF2B5EF4-FFF2-40B4-BE49-F238E27FC236}">
+                <a16:creationId xmlns:a16="http://schemas.microsoft.com/office/drawing/2014/main" id="{EF6F037D-2EAE-4D6E-BF74-CCA458DA4A68}"/>
+              </a:ext>
+            </a:extLst>
+          </p:cNvPr>
+          <p:cNvPicPr>
+            <a:picLocks noChangeAspect="1"/>
+          </p:cNvPicPr>
+          <p:nvPr/>
+        </p:nvPicPr>
+        <p:blipFill>
+          <a:blip r:embed="rId5"/>
+          <a:stretch>
+            <a:fillRect/>
+          </a:stretch>
+        </p:blipFill>
+        <p:spPr>
+          <a:xfrm>
+            <a:off x="3636798" y="851602"/>
+            <a:ext cx="1888072" cy="286238"/>
+          </a:xfrm>
+          <a:prstGeom prst="rect">
+            <a:avLst/>
+          </a:prstGeom>
+        </p:spPr>
+      </p:pic>
+    </p:spTree>
+    <p:extLst>
+      <p:ext uri="{BB962C8B-B14F-4D97-AF65-F5344CB8AC3E}">
+        <p14:creationId xmlns:p14="http://schemas.microsoft.com/office/powerpoint/2010/main" val="2030384776"/>
+      </p:ext>
+    </p:extLst>
+  </p:cSld>
+  <p:clrMapOvr>
+    <a:masterClrMapping/>
+  </p:clrMapOvr>
+  <mc:AlternateContent xmlns:mc="http://schemas.openxmlformats.org/markup-compatibility/2006" xmlns:p14="http://schemas.microsoft.com/office/powerpoint/2010/main">
+    <mc:Choice Requires="p14">
+      <p:transition spd="med" p14:dur="700">
+        <p:fade/>
+      </p:transition>
+    </mc:Choice>
+    <mc:Fallback xmlns="">
+      <p:transition spd="med">
+        <p:fade/>
+      </p:transition>
+    </mc:Fallback>
+  </mc:AlternateContent>
+</p:sld>
+</file>
+
+<file path=ppt/slides/slide11.xml><?xml version="1.0" encoding="utf-8"?>
+<p:sld xmlns:a="http://schemas.openxmlformats.org/drawingml/2006/main" xmlns:r="http://schemas.openxmlformats.org/officeDocument/2006/relationships" xmlns:p="http://schemas.openxmlformats.org/presentationml/2006/main">
+  <p:cSld>
+    <p:spTree>
+      <p:nvGrpSpPr>
+        <p:cNvPr id="1" name=""/>
+        <p:cNvGrpSpPr/>
+        <p:nvPr/>
+      </p:nvGrpSpPr>
+      <p:grpSpPr>
+        <a:xfrm>
+          <a:off x="0" y="0"/>
+          <a:ext cx="0" cy="0"/>
+          <a:chOff x="0" y="0"/>
+          <a:chExt cx="0" cy="0"/>
+        </a:xfrm>
+      </p:grpSpPr>
+      <p:sp>
+        <p:nvSpPr>
+          <p:cNvPr id="2" name="Slide Number Placeholder 1">
+            <a:extLst>
+              <a:ext uri="{FF2B5EF4-FFF2-40B4-BE49-F238E27FC236}">
+                <a16:creationId xmlns:a16="http://schemas.microsoft.com/office/drawing/2014/main" id="{17744C99-9A24-4D6F-8D3C-A4CB41E876CA}"/>
+              </a:ext>
+            </a:extLst>
+          </p:cNvPr>
+          <p:cNvSpPr>
+            <a:spLocks noGrp="1"/>
+          </p:cNvSpPr>
+          <p:nvPr>
+            <p:ph type="sldNum" sz="quarter" idx="12"/>
+          </p:nvPr>
+        </p:nvSpPr>
+        <p:spPr/>
+        <p:txBody>
+          <a:bodyPr/>
+          <a:lstStyle/>
+          <a:p>
+            <a:fld id="{EE2556C5-CE8C-6547-B838-EA80C61A4AF7}" type="slidenum">
+              <a:rPr lang="en-US" smtClean="0"/>
+              <a:pPr/>
+              <a:t>11</a:t>
+            </a:fld>
+            <a:endParaRPr lang="en-US" dirty="0"/>
+          </a:p>
+        </p:txBody>
+      </p:sp>
+      <p:sp>
+        <p:nvSpPr>
+          <p:cNvPr id="3" name="Title 2">
+            <a:extLst>
+              <a:ext uri="{FF2B5EF4-FFF2-40B4-BE49-F238E27FC236}">
+                <a16:creationId xmlns:a16="http://schemas.microsoft.com/office/drawing/2014/main" id="{DFCD3F10-262A-49AA-92F3-A28E2073C0CF}"/>
+              </a:ext>
+            </a:extLst>
+          </p:cNvPr>
+          <p:cNvSpPr>
+            <a:spLocks noGrp="1"/>
+          </p:cNvSpPr>
+          <p:nvPr>
+            <p:ph type="title"/>
+          </p:nvPr>
+        </p:nvSpPr>
+        <p:spPr>
+          <a:xfrm>
+            <a:off x="455613" y="308848"/>
+            <a:ext cx="8229600" cy="379883"/>
+          </a:xfrm>
+        </p:spPr>
+        <p:txBody>
+          <a:bodyPr/>
+          <a:lstStyle/>
+          <a:p>
+            <a:pPr>
+              <a:spcBef>
+                <a:spcPts val="600"/>
+              </a:spcBef>
+            </a:pPr>
+            <a:r>
+              <a:rPr lang="en-US" sz="3600" dirty="0"/>
               <a:t>Multi CPU – critical section code</a:t>
             </a:r>
           </a:p>
@@ -12462,7 +12693,7 @@
             </a:pPr>
             <a:r>
               <a:rPr lang="en-US" dirty="0"/>
-              <a:t>Need to protect access from other CPU or ISR while in use</a:t>
+              <a:t>Need to protect access from other CPUs or ISR while in use</a:t>
             </a:r>
           </a:p>
           <a:p>
@@ -12475,7 +12706,7 @@
             </a:pPr>
             <a:r>
               <a:rPr lang="en-US" dirty="0"/>
-              <a:t>Can use </a:t>
+              <a:t>We use </a:t>
             </a:r>
             <a:r>
               <a:rPr lang="en-US" dirty="0" err="1"/>
@@ -12600,7 +12831,7 @@
 </p:sld>
 </file>
 
-<file path=ppt/slides/slide11.xml><?xml version="1.0" encoding="utf-8"?>
+<file path=ppt/slides/slide12.xml><?xml version="1.0" encoding="utf-8"?>
 <p:sld xmlns:a="http://schemas.openxmlformats.org/drawingml/2006/main" xmlns:r="http://schemas.openxmlformats.org/officeDocument/2006/relationships" xmlns:p="http://schemas.openxmlformats.org/presentationml/2006/main">
   <p:cSld>
     <p:spTree>
@@ -12641,7 +12872,7 @@
             <a:fld id="{EE2556C5-CE8C-6547-B838-EA80C61A4AF7}" type="slidenum">
               <a:rPr lang="en-US" smtClean="0"/>
               <a:pPr/>
-              <a:t>11</a:t>
+              <a:t>12</a:t>
             </a:fld>
             <a:endParaRPr lang="en-US" dirty="0"/>
           </a:p>
@@ -12675,7 +12906,7 @@
           <a:p>
             <a:r>
               <a:rPr lang="en-US" dirty="0"/>
-              <a:t>CPU power modes</a:t>
+              <a:t>ESP32 power modes</a:t>
             </a:r>
           </a:p>
         </p:txBody>
@@ -14995,7 +15226,7 @@
 </p:sld>
 </file>
 
-<file path=ppt/slides/slide12.xml><?xml version="1.0" encoding="utf-8"?>
+<file path=ppt/slides/slide13.xml><?xml version="1.0" encoding="utf-8"?>
 <p:sld xmlns:a="http://schemas.openxmlformats.org/drawingml/2006/main" xmlns:r="http://schemas.openxmlformats.org/officeDocument/2006/relationships" xmlns:p="http://schemas.openxmlformats.org/presentationml/2006/main">
   <p:cSld>
     <p:spTree>
@@ -15036,7 +15267,7 @@
             <a:fld id="{EE2556C5-CE8C-6547-B838-EA80C61A4AF7}" type="slidenum">
               <a:rPr lang="en-US" smtClean="0"/>
               <a:pPr/>
-              <a:t>12</a:t>
+              <a:t>13</a:t>
             </a:fld>
             <a:endParaRPr lang="en-US" dirty="0"/>
           </a:p>
@@ -15297,6 +15528,36 @@
           </a:p>
         </p:txBody>
       </p:sp>
+      <p:pic>
+        <p:nvPicPr>
+          <p:cNvPr id="10" name="Picture 9">
+            <a:extLst>
+              <a:ext uri="{FF2B5EF4-FFF2-40B4-BE49-F238E27FC236}">
+                <a16:creationId xmlns:a16="http://schemas.microsoft.com/office/drawing/2014/main" id="{274E21DF-CB88-41B6-A1E1-9DBFFC1958E4}"/>
+              </a:ext>
+            </a:extLst>
+          </p:cNvPr>
+          <p:cNvPicPr>
+            <a:picLocks noChangeAspect="1"/>
+          </p:cNvPicPr>
+          <p:nvPr/>
+        </p:nvPicPr>
+        <p:blipFill>
+          <a:blip r:embed="rId5"/>
+          <a:stretch>
+            <a:fillRect/>
+          </a:stretch>
+        </p:blipFill>
+        <p:spPr>
+          <a:xfrm>
+            <a:off x="5118062" y="498789"/>
+            <a:ext cx="3324689" cy="3858163"/>
+          </a:xfrm>
+          <a:prstGeom prst="rect">
+            <a:avLst/>
+          </a:prstGeom>
+        </p:spPr>
+      </p:pic>
     </p:spTree>
     <p:extLst>
       <p:ext uri="{BB962C8B-B14F-4D97-AF65-F5344CB8AC3E}">
@@ -15322,7 +15583,7 @@
 </p:sld>
 </file>
 
-<file path=ppt/slides/slide13.xml><?xml version="1.0" encoding="utf-8"?>
+<file path=ppt/slides/slide14.xml><?xml version="1.0" encoding="utf-8"?>
 <p:sld xmlns:a="http://schemas.openxmlformats.org/drawingml/2006/main" xmlns:r="http://schemas.openxmlformats.org/officeDocument/2006/relationships" xmlns:p="http://schemas.openxmlformats.org/presentationml/2006/main">
   <p:cSld>
     <p:spTree>
@@ -16806,7 +17067,7 @@
         </p:nvSpPr>
         <p:spPr>
           <a:xfrm>
-            <a:off x="455613" y="308848"/>
+            <a:off x="454025" y="134466"/>
             <a:ext cx="8229600" cy="379883"/>
           </a:xfrm>
         </p:spPr>
@@ -16844,8 +17105,8 @@
         </p:nvSpPr>
         <p:spPr>
           <a:xfrm>
-            <a:off x="455613" y="715109"/>
-            <a:ext cx="8228012" cy="3914042"/>
+            <a:off x="454025" y="528196"/>
+            <a:ext cx="8228012" cy="4183504"/>
           </a:xfrm>
         </p:spPr>
         <p:txBody>
@@ -16976,7 +17237,7 @@
             </a:pPr>
             <a:r>
               <a:rPr lang="en-US" dirty="0"/>
-              <a:t>Move to execute a dedicated code (ISR – Interrupt service routine)</a:t>
+              <a:t>Move to execute a dedicated code (ISR – Interrupt Service Routine)</a:t>
             </a:r>
           </a:p>
           <a:p>
@@ -17015,11 +17276,24 @@
             </a:pPr>
             <a:r>
               <a:rPr lang="en-US" dirty="0"/>
-              <a:t>Make code much more efficient when addressing devices</a:t>
-            </a:r>
-          </a:p>
-          <a:p>
-            <a:pPr marL="857250" lvl="2" indent="-285750">
+              <a:t>Interrupt service routine should be as small as possible</a:t>
+            </a:r>
+          </a:p>
+          <a:p>
+            <a:pPr marL="285750" indent="-285750">
+              <a:spcBef>
+                <a:spcPts val="600"/>
+              </a:spcBef>
+              <a:buFont typeface="Arial" panose="020B0604020202020204" pitchFamily="34" charset="0"/>
+              <a:buChar char="•"/>
+            </a:pPr>
+            <a:r>
+              <a:rPr lang="en-US" dirty="0"/>
+              <a:t>ISR and our code can communicate via global variables</a:t>
+            </a:r>
+          </a:p>
+          <a:p>
+            <a:pPr marL="285750" indent="-285750">
               <a:spcBef>
                 <a:spcPts val="600"/>
               </a:spcBef>
@@ -17218,6 +17492,58 @@
             </a:r>
           </a:p>
           <a:p>
+            <a:pPr marL="285750" indent="-285750">
+              <a:spcBef>
+                <a:spcPts val="600"/>
+              </a:spcBef>
+              <a:buFont typeface="Arial" panose="020B0604020202020204" pitchFamily="34" charset="0"/>
+              <a:buChar char="•"/>
+            </a:pPr>
+            <a:r>
+              <a:rPr lang="en-US" dirty="0"/>
+              <a:t>Make more efficient code</a:t>
+            </a:r>
+          </a:p>
+          <a:p>
+            <a:pPr marL="511175" lvl="1" indent="-285750">
+              <a:spcBef>
+                <a:spcPts val="600"/>
+              </a:spcBef>
+              <a:buFont typeface="Arial" panose="020B0604020202020204" pitchFamily="34" charset="0"/>
+              <a:buChar char="•"/>
+            </a:pPr>
+            <a:r>
+              <a:rPr lang="en-US" dirty="0"/>
+              <a:t>At times saves the need to address a device or read a register</a:t>
+            </a:r>
+          </a:p>
+          <a:p>
+            <a:pPr marL="285750" indent="-285750">
+              <a:spcBef>
+                <a:spcPts val="600"/>
+              </a:spcBef>
+              <a:buFont typeface="Arial" panose="020B0604020202020204" pitchFamily="34" charset="0"/>
+              <a:buChar char="•"/>
+            </a:pPr>
+            <a:r>
+              <a:rPr lang="en-US" dirty="0"/>
+              <a:t>Save power</a:t>
+            </a:r>
+          </a:p>
+          <a:p>
+            <a:pPr marL="285750" indent="-285750">
+              <a:spcBef>
+                <a:spcPts val="600"/>
+              </a:spcBef>
+              <a:buFont typeface="Arial" panose="020B0604020202020204" pitchFamily="34" charset="0"/>
+              <a:buChar char="•"/>
+            </a:pPr>
+            <a:r>
+              <a:rPr lang="en-US" dirty="0"/>
+              <a:t>Run code in the back ground (example on next slide)</a:t>
+            </a:r>
+          </a:p>
+          <a:p>
             <a:pPr marL="857250" lvl="2" indent="-285750">
               <a:spcBef>
                 <a:spcPts val="600"/>
@@ -17229,96 +17555,6 @@
           </a:p>
         </p:txBody>
       </p:sp>
-      <p:pic>
-        <p:nvPicPr>
-          <p:cNvPr id="5" name="Picture 4">
-            <a:extLst>
-              <a:ext uri="{FF2B5EF4-FFF2-40B4-BE49-F238E27FC236}">
-                <a16:creationId xmlns:a16="http://schemas.microsoft.com/office/drawing/2014/main" id="{3F6EF4DE-D78C-4379-ADDC-B08B21C04C5C}"/>
-              </a:ext>
-            </a:extLst>
-          </p:cNvPr>
-          <p:cNvPicPr>
-            <a:picLocks noChangeAspect="1"/>
-          </p:cNvPicPr>
-          <p:nvPr/>
-        </p:nvPicPr>
-        <p:blipFill>
-          <a:blip r:embed="rId2"/>
-          <a:stretch>
-            <a:fillRect/>
-          </a:stretch>
-        </p:blipFill>
-        <p:spPr>
-          <a:xfrm>
-            <a:off x="455613" y="2145861"/>
-            <a:ext cx="2260716" cy="254013"/>
-          </a:xfrm>
-          <a:prstGeom prst="rect">
-            <a:avLst/>
-          </a:prstGeom>
-        </p:spPr>
-      </p:pic>
-      <p:pic>
-        <p:nvPicPr>
-          <p:cNvPr id="6" name="Picture 5">
-            <a:extLst>
-              <a:ext uri="{FF2B5EF4-FFF2-40B4-BE49-F238E27FC236}">
-                <a16:creationId xmlns:a16="http://schemas.microsoft.com/office/drawing/2014/main" id="{242778B2-E448-484E-A79C-E7A6924CE76A}"/>
-              </a:ext>
-            </a:extLst>
-          </p:cNvPr>
-          <p:cNvPicPr>
-            <a:picLocks noChangeAspect="1"/>
-          </p:cNvPicPr>
-          <p:nvPr/>
-        </p:nvPicPr>
-        <p:blipFill>
-          <a:blip r:embed="rId3"/>
-          <a:stretch>
-            <a:fillRect/>
-          </a:stretch>
-        </p:blipFill>
-        <p:spPr>
-          <a:xfrm>
-            <a:off x="455613" y="2501067"/>
-            <a:ext cx="3347726" cy="1188236"/>
-          </a:xfrm>
-          <a:prstGeom prst="rect">
-            <a:avLst/>
-          </a:prstGeom>
-        </p:spPr>
-      </p:pic>
-      <p:pic>
-        <p:nvPicPr>
-          <p:cNvPr id="7" name="Picture 6">
-            <a:extLst>
-              <a:ext uri="{FF2B5EF4-FFF2-40B4-BE49-F238E27FC236}">
-                <a16:creationId xmlns:a16="http://schemas.microsoft.com/office/drawing/2014/main" id="{8B76D5DD-0532-4620-ABFA-6736D4940FA3}"/>
-              </a:ext>
-            </a:extLst>
-          </p:cNvPr>
-          <p:cNvPicPr>
-            <a:picLocks noChangeAspect="1"/>
-          </p:cNvPicPr>
-          <p:nvPr/>
-        </p:nvPicPr>
-        <p:blipFill>
-          <a:blip r:embed="rId4"/>
-          <a:stretch>
-            <a:fillRect/>
-          </a:stretch>
-        </p:blipFill>
-        <p:spPr>
-          <a:xfrm>
-            <a:off x="385759" y="3689303"/>
-            <a:ext cx="4661140" cy="939848"/>
-          </a:xfrm>
-          <a:prstGeom prst="rect">
-            <a:avLst/>
-          </a:prstGeom>
-        </p:spPr>
-      </p:pic>
     </p:spTree>
     <p:extLst>
       <p:ext uri="{BB962C8B-B14F-4D97-AF65-F5344CB8AC3E}">
@@ -17424,17 +17660,368 @@
             </a:pPr>
             <a:r>
               <a:rPr lang="en-US" sz="3600" dirty="0"/>
-              <a:t>Interrupts – from an I/O pin</a:t>
+              <a:t>Interrupts – sound stream playing example</a:t>
+            </a:r>
+          </a:p>
+        </p:txBody>
+      </p:sp>
+      <p:sp>
+        <p:nvSpPr>
+          <p:cNvPr id="4" name="Content Placeholder 3">
+            <a:extLst>
+              <a:ext uri="{FF2B5EF4-FFF2-40B4-BE49-F238E27FC236}">
+                <a16:creationId xmlns:a16="http://schemas.microsoft.com/office/drawing/2014/main" id="{0DA5B5C6-365A-4798-8EE3-9AAC1659E9D7}"/>
+              </a:ext>
+            </a:extLst>
+          </p:cNvPr>
+          <p:cNvSpPr>
+            <a:spLocks noGrp="1"/>
+          </p:cNvSpPr>
+          <p:nvPr>
+            <p:ph sz="quarter" idx="13"/>
+          </p:nvPr>
+        </p:nvSpPr>
+        <p:spPr>
+          <a:xfrm>
+            <a:off x="455613" y="715109"/>
+            <a:ext cx="8228012" cy="3914042"/>
+          </a:xfrm>
+        </p:spPr>
+        <p:txBody>
+          <a:bodyPr/>
+          <a:lstStyle/>
+          <a:p>
+            <a:pPr marL="285750" indent="-285750">
+              <a:spcBef>
+                <a:spcPts val="600"/>
+              </a:spcBef>
+              <a:buFont typeface="Arial" panose="020B0604020202020204" pitchFamily="34" charset="0"/>
+              <a:buChar char="•"/>
+            </a:pPr>
+            <a:r>
+              <a:rPr lang="en-US" dirty="0"/>
+              <a:t>Each node contains the note and duration</a:t>
+            </a:r>
+          </a:p>
+          <a:p>
+            <a:pPr marL="285750" indent="-285750">
+              <a:spcBef>
+                <a:spcPts val="600"/>
+              </a:spcBef>
+              <a:buFont typeface="Arial" panose="020B0604020202020204" pitchFamily="34" charset="0"/>
+              <a:buChar char="•"/>
+            </a:pPr>
+            <a:r>
+              <a:rPr lang="en-US" dirty="0"/>
+              <a:t>In the ISR we set the note to play and set the timer to trigger an interrupt after duration </a:t>
+            </a:r>
+          </a:p>
+          <a:p>
+            <a:pPr marL="285750" indent="-285750">
+              <a:spcBef>
+                <a:spcPts val="600"/>
+              </a:spcBef>
+              <a:buFont typeface="Arial" panose="020B0604020202020204" pitchFamily="34" charset="0"/>
+              <a:buChar char="•"/>
+            </a:pPr>
+            <a:r>
+              <a:rPr lang="en-US" dirty="0"/>
+              <a:t>This way stream is playing in the background</a:t>
+            </a:r>
+          </a:p>
+          <a:p>
+            <a:pPr marL="285750" indent="-285750">
+              <a:spcBef>
+                <a:spcPts val="600"/>
+              </a:spcBef>
+              <a:buFont typeface="Arial" panose="020B0604020202020204" pitchFamily="34" charset="0"/>
+              <a:buChar char="•"/>
+            </a:pPr>
+            <a:r>
+              <a:rPr lang="en-US" dirty="0"/>
+              <a:t>Any other way can be very complicated </a:t>
+            </a:r>
+          </a:p>
+        </p:txBody>
+      </p:sp>
+      <p:sp>
+        <p:nvSpPr>
+          <p:cNvPr id="8" name="TextBox 7">
+            <a:extLst>
+              <a:ext uri="{FF2B5EF4-FFF2-40B4-BE49-F238E27FC236}">
+                <a16:creationId xmlns:a16="http://schemas.microsoft.com/office/drawing/2014/main" id="{5F9456DE-F729-4ED4-B328-1BF44ACD2EFA}"/>
+              </a:ext>
+            </a:extLst>
+          </p:cNvPr>
+          <p:cNvSpPr txBox="1"/>
+          <p:nvPr/>
+        </p:nvSpPr>
+        <p:spPr>
+          <a:xfrm>
+            <a:off x="1447800" y="4287080"/>
+            <a:ext cx="1320800" cy="338554"/>
+          </a:xfrm>
+          <a:prstGeom prst="rect">
+            <a:avLst/>
+          </a:prstGeom>
+          <a:solidFill>
+            <a:schemeClr val="accent1">
+              <a:lumMod val="20000"/>
+              <a:lumOff val="80000"/>
+            </a:schemeClr>
+          </a:solidFill>
+        </p:spPr>
+        <p:style>
+          <a:lnRef idx="2">
+            <a:schemeClr val="accent3"/>
+          </a:lnRef>
+          <a:fillRef idx="1">
+            <a:schemeClr val="lt1"/>
+          </a:fillRef>
+          <a:effectRef idx="0">
+            <a:schemeClr val="accent3"/>
+          </a:effectRef>
+          <a:fontRef idx="minor">
+            <a:schemeClr val="dk1"/>
+          </a:fontRef>
+        </p:style>
+        <p:txBody>
+          <a:bodyPr vert="horz" wrap="square" lIns="0" tIns="0" rIns="0" bIns="0" rtlCol="0">
+            <a:spAutoFit/>
+          </a:bodyPr>
+          <a:lstStyle/>
+          <a:p>
+            <a:r>
+              <a:rPr lang="en-US" sz="1100" dirty="0">
+                <a:solidFill>
+                  <a:srgbClr val="003C71"/>
+                </a:solidFill>
+              </a:rPr>
+              <a:t>Note: C5</a:t>
+            </a:r>
+          </a:p>
+          <a:p>
+            <a:r>
+              <a:rPr lang="en-US" sz="1100" dirty="0">
+                <a:solidFill>
+                  <a:srgbClr val="003C71"/>
+                </a:solidFill>
+              </a:rPr>
+              <a:t>Duration: 250ms</a:t>
+            </a:r>
+          </a:p>
+        </p:txBody>
+      </p:sp>
+      <p:sp>
+        <p:nvSpPr>
+          <p:cNvPr id="9" name="TextBox 8">
+            <a:extLst>
+              <a:ext uri="{FF2B5EF4-FFF2-40B4-BE49-F238E27FC236}">
+                <a16:creationId xmlns:a16="http://schemas.microsoft.com/office/drawing/2014/main" id="{20EF0E15-9F18-4084-BEBD-A7EFD4FFAB2E}"/>
+              </a:ext>
+            </a:extLst>
+          </p:cNvPr>
+          <p:cNvSpPr txBox="1"/>
+          <p:nvPr/>
+        </p:nvSpPr>
+        <p:spPr>
+          <a:xfrm>
+            <a:off x="3009900" y="4287080"/>
+            <a:ext cx="1320800" cy="338554"/>
+          </a:xfrm>
+          <a:prstGeom prst="rect">
+            <a:avLst/>
+          </a:prstGeom>
+          <a:solidFill>
+            <a:schemeClr val="accent1">
+              <a:lumMod val="20000"/>
+              <a:lumOff val="80000"/>
+            </a:schemeClr>
+          </a:solidFill>
+        </p:spPr>
+        <p:style>
+          <a:lnRef idx="2">
+            <a:schemeClr val="accent3"/>
+          </a:lnRef>
+          <a:fillRef idx="1">
+            <a:schemeClr val="lt1"/>
+          </a:fillRef>
+          <a:effectRef idx="0">
+            <a:schemeClr val="accent3"/>
+          </a:effectRef>
+          <a:fontRef idx="minor">
+            <a:schemeClr val="dk1"/>
+          </a:fontRef>
+        </p:style>
+        <p:txBody>
+          <a:bodyPr vert="horz" wrap="square" lIns="0" tIns="0" rIns="0" bIns="0" rtlCol="0">
+            <a:spAutoFit/>
+          </a:bodyPr>
+          <a:lstStyle/>
+          <a:p>
+            <a:r>
+              <a:rPr lang="en-US" sz="1100" dirty="0">
+                <a:solidFill>
+                  <a:srgbClr val="003C71"/>
+                </a:solidFill>
+              </a:rPr>
+              <a:t>Note: B4</a:t>
+            </a:r>
+          </a:p>
+          <a:p>
+            <a:r>
+              <a:rPr lang="en-US" sz="1100" dirty="0">
+                <a:solidFill>
+                  <a:srgbClr val="003C71"/>
+                </a:solidFill>
+              </a:rPr>
+              <a:t>Duration: 250ms</a:t>
+            </a:r>
+          </a:p>
+        </p:txBody>
+      </p:sp>
+      <p:sp>
+        <p:nvSpPr>
+          <p:cNvPr id="10" name="TextBox 9">
+            <a:extLst>
+              <a:ext uri="{FF2B5EF4-FFF2-40B4-BE49-F238E27FC236}">
+                <a16:creationId xmlns:a16="http://schemas.microsoft.com/office/drawing/2014/main" id="{4CCDE40E-C943-4983-8EE1-6BC79E9B1903}"/>
+              </a:ext>
+            </a:extLst>
+          </p:cNvPr>
+          <p:cNvSpPr txBox="1"/>
+          <p:nvPr/>
+        </p:nvSpPr>
+        <p:spPr>
+          <a:xfrm>
+            <a:off x="4572000" y="4287080"/>
+            <a:ext cx="1320800" cy="338554"/>
+          </a:xfrm>
+          <a:prstGeom prst="rect">
+            <a:avLst/>
+          </a:prstGeom>
+          <a:solidFill>
+            <a:schemeClr val="accent1">
+              <a:lumMod val="20000"/>
+              <a:lumOff val="80000"/>
+            </a:schemeClr>
+          </a:solidFill>
+        </p:spPr>
+        <p:style>
+          <a:lnRef idx="2">
+            <a:schemeClr val="accent3"/>
+          </a:lnRef>
+          <a:fillRef idx="1">
+            <a:schemeClr val="lt1"/>
+          </a:fillRef>
+          <a:effectRef idx="0">
+            <a:schemeClr val="accent3"/>
+          </a:effectRef>
+          <a:fontRef idx="minor">
+            <a:schemeClr val="dk1"/>
+          </a:fontRef>
+        </p:style>
+        <p:txBody>
+          <a:bodyPr vert="horz" wrap="square" lIns="0" tIns="0" rIns="0" bIns="0" rtlCol="0">
+            <a:spAutoFit/>
+          </a:bodyPr>
+          <a:lstStyle/>
+          <a:p>
+            <a:r>
+              <a:rPr lang="en-US" sz="1100" dirty="0">
+                <a:solidFill>
+                  <a:srgbClr val="003C71"/>
+                </a:solidFill>
+              </a:rPr>
+              <a:t>Note: None</a:t>
+            </a:r>
+          </a:p>
+          <a:p>
+            <a:r>
+              <a:rPr lang="en-US" sz="1100" dirty="0">
+                <a:solidFill>
+                  <a:srgbClr val="003C71"/>
+                </a:solidFill>
+              </a:rPr>
+              <a:t>Duration: 1000ms</a:t>
+            </a:r>
+          </a:p>
+        </p:txBody>
+      </p:sp>
+      <p:sp>
+        <p:nvSpPr>
+          <p:cNvPr id="11" name="TextBox 10">
+            <a:extLst>
+              <a:ext uri="{FF2B5EF4-FFF2-40B4-BE49-F238E27FC236}">
+                <a16:creationId xmlns:a16="http://schemas.microsoft.com/office/drawing/2014/main" id="{4FDF215A-EBAF-488B-A44F-5AC06594E440}"/>
+              </a:ext>
+            </a:extLst>
+          </p:cNvPr>
+          <p:cNvSpPr txBox="1"/>
+          <p:nvPr/>
+        </p:nvSpPr>
+        <p:spPr>
+          <a:xfrm>
+            <a:off x="6134100" y="4282734"/>
+            <a:ext cx="1320800" cy="338554"/>
+          </a:xfrm>
+          <a:prstGeom prst="rect">
+            <a:avLst/>
+          </a:prstGeom>
+          <a:solidFill>
+            <a:schemeClr val="accent1">
+              <a:lumMod val="20000"/>
+              <a:lumOff val="80000"/>
+            </a:schemeClr>
+          </a:solidFill>
+        </p:spPr>
+        <p:style>
+          <a:lnRef idx="2">
+            <a:schemeClr val="accent3"/>
+          </a:lnRef>
+          <a:fillRef idx="1">
+            <a:schemeClr val="lt1"/>
+          </a:fillRef>
+          <a:effectRef idx="0">
+            <a:schemeClr val="accent3"/>
+          </a:effectRef>
+          <a:fontRef idx="minor">
+            <a:schemeClr val="dk1"/>
+          </a:fontRef>
+        </p:style>
+        <p:txBody>
+          <a:bodyPr vert="horz" wrap="square" lIns="0" tIns="0" rIns="0" bIns="0" rtlCol="0">
+            <a:spAutoFit/>
+          </a:bodyPr>
+          <a:lstStyle/>
+          <a:p>
+            <a:r>
+              <a:rPr lang="en-US" sz="1100" dirty="0">
+                <a:solidFill>
+                  <a:srgbClr val="003C71"/>
+                </a:solidFill>
+              </a:rPr>
+              <a:t>Note: F3</a:t>
+            </a:r>
+          </a:p>
+          <a:p>
+            <a:r>
+              <a:rPr lang="en-US" sz="1100" dirty="0">
+                <a:solidFill>
+                  <a:srgbClr val="003C71"/>
+                </a:solidFill>
+              </a:rPr>
+              <a:t>Duration: 150ms</a:t>
             </a:r>
           </a:p>
         </p:txBody>
       </p:sp>
       <p:pic>
         <p:nvPicPr>
-          <p:cNvPr id="10" name="Picture 9">
+          <p:cNvPr id="12" name="Picture 11">
             <a:extLst>
               <a:ext uri="{FF2B5EF4-FFF2-40B4-BE49-F238E27FC236}">
-                <a16:creationId xmlns:a16="http://schemas.microsoft.com/office/drawing/2014/main" id="{0E131498-53B6-4AC0-B776-EE34A971A3EE}"/>
+                <a16:creationId xmlns:a16="http://schemas.microsoft.com/office/drawing/2014/main" id="{E2D774E8-2E7A-4260-B7FE-CC5C4F3C8903}"/>
               </a:ext>
             </a:extLst>
           </p:cNvPr>
@@ -17451,8 +18038,8 @@
         </p:blipFill>
         <p:spPr>
           <a:xfrm>
-            <a:off x="455613" y="851601"/>
-            <a:ext cx="3048157" cy="285765"/>
+            <a:off x="455613" y="2443797"/>
+            <a:ext cx="2260716" cy="254013"/>
           </a:xfrm>
           <a:prstGeom prst="rect">
             <a:avLst/>
@@ -17461,10 +18048,10 @@
       </p:pic>
       <p:pic>
         <p:nvPicPr>
-          <p:cNvPr id="11" name="Picture 10">
+          <p:cNvPr id="13" name="Picture 12">
             <a:extLst>
               <a:ext uri="{FF2B5EF4-FFF2-40B4-BE49-F238E27FC236}">
-                <a16:creationId xmlns:a16="http://schemas.microsoft.com/office/drawing/2014/main" id="{2A77DAE2-ABA6-4270-AA7A-79AC4F9C03D9}"/>
+                <a16:creationId xmlns:a16="http://schemas.microsoft.com/office/drawing/2014/main" id="{5089E6C4-2717-44FF-8F93-C7B41976CC63}"/>
               </a:ext>
             </a:extLst>
           </p:cNvPr>
@@ -17481,8 +18068,8 @@
         </p:blipFill>
         <p:spPr>
           <a:xfrm>
-            <a:off x="3729746" y="1224463"/>
-            <a:ext cx="4030464" cy="1216816"/>
+            <a:off x="455613" y="2916159"/>
+            <a:ext cx="3347726" cy="1188236"/>
           </a:xfrm>
           <a:prstGeom prst="rect">
             <a:avLst/>
@@ -17491,10 +18078,10 @@
       </p:pic>
       <p:pic>
         <p:nvPicPr>
-          <p:cNvPr id="13" name="Picture 12">
+          <p:cNvPr id="14" name="Picture 13">
             <a:extLst>
               <a:ext uri="{FF2B5EF4-FFF2-40B4-BE49-F238E27FC236}">
-                <a16:creationId xmlns:a16="http://schemas.microsoft.com/office/drawing/2014/main" id="{E5752BCD-FE8E-4D62-BC1F-9F016039C638}"/>
+                <a16:creationId xmlns:a16="http://schemas.microsoft.com/office/drawing/2014/main" id="{685F0198-D247-45A6-BE69-8BA44776E3A9}"/>
               </a:ext>
             </a:extLst>
           </p:cNvPr>
@@ -17511,38 +18098,8 @@
         </p:blipFill>
         <p:spPr>
           <a:xfrm>
-            <a:off x="455613" y="1300236"/>
-            <a:ext cx="3006289" cy="3129297"/>
-          </a:xfrm>
-          <a:prstGeom prst="rect">
-            <a:avLst/>
-          </a:prstGeom>
-        </p:spPr>
-      </p:pic>
-      <p:pic>
-        <p:nvPicPr>
-          <p:cNvPr id="14" name="Picture 13">
-            <a:extLst>
-              <a:ext uri="{FF2B5EF4-FFF2-40B4-BE49-F238E27FC236}">
-                <a16:creationId xmlns:a16="http://schemas.microsoft.com/office/drawing/2014/main" id="{EF6F037D-2EAE-4D6E-BF74-CCA458DA4A68}"/>
-              </a:ext>
-            </a:extLst>
-          </p:cNvPr>
-          <p:cNvPicPr>
-            <a:picLocks noChangeAspect="1"/>
-          </p:cNvPicPr>
-          <p:nvPr/>
-        </p:nvPicPr>
-        <p:blipFill>
-          <a:blip r:embed="rId5"/>
-          <a:stretch>
-            <a:fillRect/>
-          </a:stretch>
-        </p:blipFill>
-        <p:spPr>
-          <a:xfrm>
-            <a:off x="3636798" y="851602"/>
-            <a:ext cx="1888072" cy="286238"/>
+            <a:off x="4189409" y="3117289"/>
+            <a:ext cx="4661140" cy="939848"/>
           </a:xfrm>
           <a:prstGeom prst="rect">
             <a:avLst/>
@@ -17552,7 +18109,7 @@
     </p:spTree>
     <p:extLst>
       <p:ext uri="{BB962C8B-B14F-4D97-AF65-F5344CB8AC3E}">
-        <p14:creationId xmlns:p14="http://schemas.microsoft.com/office/powerpoint/2010/main" val="2030384776"/>
+        <p14:creationId xmlns:p14="http://schemas.microsoft.com/office/powerpoint/2010/main" val="1056520839"/>
       </p:ext>
     </p:extLst>
   </p:cSld>

</xml_diff>